<commit_message>
Add last version PowerPoint
</commit_message>
<xml_diff>
--- a/Analyse données.pptx
+++ b/Analyse données.pptx
@@ -11,8 +11,15 @@
     <p:sldId id="259" r:id="rId5"/>
     <p:sldId id="260" r:id="rId6"/>
     <p:sldId id="261" r:id="rId7"/>
-    <p:sldId id="262" r:id="rId8"/>
-    <p:sldId id="263" r:id="rId9"/>
+    <p:sldId id="267" r:id="rId8"/>
+    <p:sldId id="268" r:id="rId9"/>
+    <p:sldId id="262" r:id="rId10"/>
+    <p:sldId id="263" r:id="rId11"/>
+    <p:sldId id="264" r:id="rId12"/>
+    <p:sldId id="265" r:id="rId13"/>
+    <p:sldId id="266" r:id="rId14"/>
+    <p:sldId id="269" r:id="rId15"/>
+    <p:sldId id="270" r:id="rId16"/>
   </p:sldIdLst>
   <p:sldSz cx="12192000" cy="6858000"/>
   <p:notesSz cx="6858000" cy="9144000"/>
@@ -3886,6 +3893,839 @@
 </p:sld>
 </file>
 
+<file path=ppt/slides/slide10.xml><?xml version="1.0" encoding="utf-8"?>
+<p:sld xmlns:a="http://schemas.openxmlformats.org/drawingml/2006/main" xmlns:r="http://schemas.openxmlformats.org/officeDocument/2006/relationships" xmlns:p="http://schemas.openxmlformats.org/presentationml/2006/main">
+  <p:cSld>
+    <p:spTree>
+      <p:nvGrpSpPr>
+        <p:cNvPr id="1" name=""/>
+        <p:cNvGrpSpPr/>
+        <p:nvPr/>
+      </p:nvGrpSpPr>
+      <p:grpSpPr>
+        <a:xfrm>
+          <a:off x="0" y="0"/>
+          <a:ext cx="0" cy="0"/>
+          <a:chOff x="0" y="0"/>
+          <a:chExt cx="0" cy="0"/>
+        </a:xfrm>
+      </p:grpSpPr>
+      <p:sp>
+        <p:nvSpPr>
+          <p:cNvPr id="2" name="Titre 1">
+            <a:extLst>
+              <a:ext uri="{FF2B5EF4-FFF2-40B4-BE49-F238E27FC236}">
+                <a16:creationId xmlns:a16="http://schemas.microsoft.com/office/drawing/2014/main" id="{0EBAD006-2949-4554-9FD8-89C819A6560B}"/>
+              </a:ext>
+            </a:extLst>
+          </p:cNvPr>
+          <p:cNvSpPr>
+            <a:spLocks noGrp="1"/>
+          </p:cNvSpPr>
+          <p:nvPr>
+            <p:ph type="title"/>
+          </p:nvPr>
+        </p:nvSpPr>
+        <p:spPr/>
+        <p:txBody>
+          <a:bodyPr/>
+          <a:lstStyle/>
+          <a:p>
+            <a:r>
+              <a:rPr lang="fr-FR" dirty="0"/>
+              <a:t>Filtrage des données après analyse</a:t>
+            </a:r>
+          </a:p>
+        </p:txBody>
+      </p:sp>
+      <p:pic>
+        <p:nvPicPr>
+          <p:cNvPr id="5" name="Espace réservé du contenu 4">
+            <a:extLst>
+              <a:ext uri="{FF2B5EF4-FFF2-40B4-BE49-F238E27FC236}">
+                <a16:creationId xmlns:a16="http://schemas.microsoft.com/office/drawing/2014/main" id="{D7216D6B-770E-433D-971C-302BA8D5F476}"/>
+              </a:ext>
+            </a:extLst>
+          </p:cNvPr>
+          <p:cNvPicPr>
+            <a:picLocks noGrp="1" noChangeAspect="1"/>
+          </p:cNvPicPr>
+          <p:nvPr>
+            <p:ph idx="1"/>
+          </p:nvPr>
+        </p:nvPicPr>
+        <p:blipFill>
+          <a:blip r:embed="rId2"/>
+          <a:stretch>
+            <a:fillRect/>
+          </a:stretch>
+        </p:blipFill>
+        <p:spPr>
+          <a:xfrm>
+            <a:off x="3318145" y="1845793"/>
+            <a:ext cx="5282539" cy="3530159"/>
+          </a:xfrm>
+        </p:spPr>
+      </p:pic>
+      <p:sp>
+        <p:nvSpPr>
+          <p:cNvPr id="7" name="ZoneTexte 6">
+            <a:extLst>
+              <a:ext uri="{FF2B5EF4-FFF2-40B4-BE49-F238E27FC236}">
+                <a16:creationId xmlns:a16="http://schemas.microsoft.com/office/drawing/2014/main" id="{A8F59E4A-88CA-4643-9852-E8E3A88A5D91}"/>
+              </a:ext>
+            </a:extLst>
+          </p:cNvPr>
+          <p:cNvSpPr txBox="1"/>
+          <p:nvPr/>
+        </p:nvSpPr>
+        <p:spPr>
+          <a:xfrm>
+            <a:off x="1598762" y="5601419"/>
+            <a:ext cx="9389430" cy="923330"/>
+          </a:xfrm>
+          <a:prstGeom prst="rect">
+            <a:avLst/>
+          </a:prstGeom>
+          <a:noFill/>
+        </p:spPr>
+        <p:txBody>
+          <a:bodyPr wrap="none" rtlCol="0">
+            <a:spAutoFit/>
+          </a:bodyPr>
+          <a:lstStyle/>
+          <a:p>
+            <a:r>
+              <a:rPr lang="fr-FR" dirty="0"/>
+              <a:t>Histogramme représentant le nombre total de minute jouées par les joueurs. Ca va permettre </a:t>
+            </a:r>
+          </a:p>
+          <a:p>
+            <a:r>
+              <a:rPr lang="fr-FR" dirty="0"/>
+              <a:t>sur tout les joueurs restant du </a:t>
+            </a:r>
+            <a:r>
+              <a:rPr lang="fr-FR" dirty="0" err="1"/>
+              <a:t>dataset</a:t>
+            </a:r>
+            <a:r>
+              <a:rPr lang="fr-FR" dirty="0"/>
+              <a:t> de faire une moyenne du temps joué. Ici la moyenne est</a:t>
+            </a:r>
+          </a:p>
+          <a:p>
+            <a:r>
+              <a:rPr lang="fr-FR" dirty="0"/>
+              <a:t>De 3000 minutes</a:t>
+            </a:r>
+          </a:p>
+        </p:txBody>
+      </p:sp>
+    </p:spTree>
+    <p:extLst>
+      <p:ext uri="{BB962C8B-B14F-4D97-AF65-F5344CB8AC3E}">
+        <p14:creationId xmlns:p14="http://schemas.microsoft.com/office/powerpoint/2010/main" val="4120447997"/>
+      </p:ext>
+    </p:extLst>
+  </p:cSld>
+  <p:clrMapOvr>
+    <a:masterClrMapping/>
+  </p:clrMapOvr>
+</p:sld>
+</file>
+
+<file path=ppt/slides/slide11.xml><?xml version="1.0" encoding="utf-8"?>
+<p:sld xmlns:a="http://schemas.openxmlformats.org/drawingml/2006/main" xmlns:r="http://schemas.openxmlformats.org/officeDocument/2006/relationships" xmlns:p="http://schemas.openxmlformats.org/presentationml/2006/main">
+  <p:cSld>
+    <p:spTree>
+      <p:nvGrpSpPr>
+        <p:cNvPr id="1" name=""/>
+        <p:cNvGrpSpPr/>
+        <p:nvPr/>
+      </p:nvGrpSpPr>
+      <p:grpSpPr>
+        <a:xfrm>
+          <a:off x="0" y="0"/>
+          <a:ext cx="0" cy="0"/>
+          <a:chOff x="0" y="0"/>
+          <a:chExt cx="0" cy="0"/>
+        </a:xfrm>
+      </p:grpSpPr>
+      <p:sp>
+        <p:nvSpPr>
+          <p:cNvPr id="2" name="Titre 1">
+            <a:extLst>
+              <a:ext uri="{FF2B5EF4-FFF2-40B4-BE49-F238E27FC236}">
+                <a16:creationId xmlns:a16="http://schemas.microsoft.com/office/drawing/2014/main" id="{BB05F022-E63F-427C-911C-8B05404CFCC7}"/>
+              </a:ext>
+            </a:extLst>
+          </p:cNvPr>
+          <p:cNvSpPr>
+            <a:spLocks noGrp="1"/>
+          </p:cNvSpPr>
+          <p:nvPr>
+            <p:ph type="title"/>
+          </p:nvPr>
+        </p:nvSpPr>
+        <p:spPr/>
+        <p:txBody>
+          <a:bodyPr/>
+          <a:lstStyle/>
+          <a:p>
+            <a:r>
+              <a:rPr lang="fr-FR" dirty="0"/>
+              <a:t>Filtrage des données après analyse </a:t>
+            </a:r>
+          </a:p>
+        </p:txBody>
+      </p:sp>
+      <p:pic>
+        <p:nvPicPr>
+          <p:cNvPr id="5" name="Espace réservé du contenu 4">
+            <a:extLst>
+              <a:ext uri="{FF2B5EF4-FFF2-40B4-BE49-F238E27FC236}">
+                <a16:creationId xmlns:a16="http://schemas.microsoft.com/office/drawing/2014/main" id="{9440BBAE-EFDD-47CA-BC45-DADEBAF0952C}"/>
+              </a:ext>
+            </a:extLst>
+          </p:cNvPr>
+          <p:cNvPicPr>
+            <a:picLocks noGrp="1" noChangeAspect="1"/>
+          </p:cNvPicPr>
+          <p:nvPr>
+            <p:ph idx="1"/>
+          </p:nvPr>
+        </p:nvPicPr>
+        <p:blipFill>
+          <a:blip r:embed="rId2"/>
+          <a:stretch>
+            <a:fillRect/>
+          </a:stretch>
+        </p:blipFill>
+        <p:spPr>
+          <a:xfrm>
+            <a:off x="1371600" y="1931459"/>
+            <a:ext cx="4347136" cy="3117869"/>
+          </a:xfrm>
+        </p:spPr>
+      </p:pic>
+      <p:pic>
+        <p:nvPicPr>
+          <p:cNvPr id="7" name="Image 6">
+            <a:extLst>
+              <a:ext uri="{FF2B5EF4-FFF2-40B4-BE49-F238E27FC236}">
+                <a16:creationId xmlns:a16="http://schemas.microsoft.com/office/drawing/2014/main" id="{2FF74D03-C02E-4C39-8B79-6641D0FDE98F}"/>
+              </a:ext>
+            </a:extLst>
+          </p:cNvPr>
+          <p:cNvPicPr>
+            <a:picLocks noChangeAspect="1"/>
+          </p:cNvPicPr>
+          <p:nvPr/>
+        </p:nvPicPr>
+        <p:blipFill>
+          <a:blip r:embed="rId3"/>
+          <a:stretch>
+            <a:fillRect/>
+          </a:stretch>
+        </p:blipFill>
+        <p:spPr>
+          <a:xfrm>
+            <a:off x="5924519" y="2257604"/>
+            <a:ext cx="6152464" cy="2342791"/>
+          </a:xfrm>
+          <a:prstGeom prst="rect">
+            <a:avLst/>
+          </a:prstGeom>
+        </p:spPr>
+      </p:pic>
+      <p:sp>
+        <p:nvSpPr>
+          <p:cNvPr id="8" name="ZoneTexte 7">
+            <a:extLst>
+              <a:ext uri="{FF2B5EF4-FFF2-40B4-BE49-F238E27FC236}">
+                <a16:creationId xmlns:a16="http://schemas.microsoft.com/office/drawing/2014/main" id="{E86FA76B-90B7-4196-A702-FB81A9662204}"/>
+              </a:ext>
+            </a:extLst>
+          </p:cNvPr>
+          <p:cNvSpPr txBox="1"/>
+          <p:nvPr/>
+        </p:nvSpPr>
+        <p:spPr>
+          <a:xfrm>
+            <a:off x="1371600" y="5658928"/>
+            <a:ext cx="10030310" cy="646331"/>
+          </a:xfrm>
+          <a:prstGeom prst="rect">
+            <a:avLst/>
+          </a:prstGeom>
+          <a:noFill/>
+        </p:spPr>
+        <p:txBody>
+          <a:bodyPr wrap="none" rtlCol="0">
+            <a:spAutoFit/>
+          </a:bodyPr>
+          <a:lstStyle/>
+          <a:p>
+            <a:r>
+              <a:rPr lang="fr-FR" dirty="0"/>
+              <a:t>Ces graphiques permettent de savoir la majorité des club et pays du club des joueurs encore présent </a:t>
+            </a:r>
+          </a:p>
+          <a:p>
+            <a:r>
+              <a:rPr lang="fr-FR" dirty="0"/>
+              <a:t>dans le </a:t>
+            </a:r>
+            <a:r>
+              <a:rPr lang="fr-FR" dirty="0" err="1"/>
+              <a:t>dataset</a:t>
+            </a:r>
+            <a:endParaRPr lang="fr-FR" dirty="0"/>
+          </a:p>
+        </p:txBody>
+      </p:sp>
+    </p:spTree>
+    <p:extLst>
+      <p:ext uri="{BB962C8B-B14F-4D97-AF65-F5344CB8AC3E}">
+        <p14:creationId xmlns:p14="http://schemas.microsoft.com/office/powerpoint/2010/main" val="2640558071"/>
+      </p:ext>
+    </p:extLst>
+  </p:cSld>
+  <p:clrMapOvr>
+    <a:masterClrMapping/>
+  </p:clrMapOvr>
+</p:sld>
+</file>
+
+<file path=ppt/slides/slide12.xml><?xml version="1.0" encoding="utf-8"?>
+<p:sld xmlns:a="http://schemas.openxmlformats.org/drawingml/2006/main" xmlns:r="http://schemas.openxmlformats.org/officeDocument/2006/relationships" xmlns:p="http://schemas.openxmlformats.org/presentationml/2006/main">
+  <p:cSld>
+    <p:spTree>
+      <p:nvGrpSpPr>
+        <p:cNvPr id="1" name=""/>
+        <p:cNvGrpSpPr/>
+        <p:nvPr/>
+      </p:nvGrpSpPr>
+      <p:grpSpPr>
+        <a:xfrm>
+          <a:off x="0" y="0"/>
+          <a:ext cx="0" cy="0"/>
+          <a:chOff x="0" y="0"/>
+          <a:chExt cx="0" cy="0"/>
+        </a:xfrm>
+      </p:grpSpPr>
+      <p:sp>
+        <p:nvSpPr>
+          <p:cNvPr id="2" name="Titre 1">
+            <a:extLst>
+              <a:ext uri="{FF2B5EF4-FFF2-40B4-BE49-F238E27FC236}">
+                <a16:creationId xmlns:a16="http://schemas.microsoft.com/office/drawing/2014/main" id="{ABE5F394-4462-4385-B5A3-E6D03D8589D0}"/>
+              </a:ext>
+            </a:extLst>
+          </p:cNvPr>
+          <p:cNvSpPr>
+            <a:spLocks noGrp="1"/>
+          </p:cNvSpPr>
+          <p:nvPr>
+            <p:ph type="title"/>
+          </p:nvPr>
+        </p:nvSpPr>
+        <p:spPr/>
+        <p:txBody>
+          <a:bodyPr/>
+          <a:lstStyle/>
+          <a:p>
+            <a:r>
+              <a:rPr lang="fr-FR" dirty="0"/>
+              <a:t>Analyse des données restants</a:t>
+            </a:r>
+          </a:p>
+        </p:txBody>
+      </p:sp>
+      <p:pic>
+        <p:nvPicPr>
+          <p:cNvPr id="7" name="Image 6">
+            <a:extLst>
+              <a:ext uri="{FF2B5EF4-FFF2-40B4-BE49-F238E27FC236}">
+                <a16:creationId xmlns:a16="http://schemas.microsoft.com/office/drawing/2014/main" id="{61895740-5862-413D-8BEF-C68BD1DB7436}"/>
+              </a:ext>
+            </a:extLst>
+          </p:cNvPr>
+          <p:cNvPicPr>
+            <a:picLocks noChangeAspect="1"/>
+          </p:cNvPicPr>
+          <p:nvPr/>
+        </p:nvPicPr>
+        <p:blipFill>
+          <a:blip r:embed="rId2"/>
+          <a:stretch>
+            <a:fillRect/>
+          </a:stretch>
+        </p:blipFill>
+        <p:spPr>
+          <a:xfrm>
+            <a:off x="2003752" y="3429000"/>
+            <a:ext cx="8184495" cy="2998951"/>
+          </a:xfrm>
+          <a:prstGeom prst="rect">
+            <a:avLst/>
+          </a:prstGeom>
+        </p:spPr>
+      </p:pic>
+      <p:pic>
+        <p:nvPicPr>
+          <p:cNvPr id="11" name="Espace réservé du contenu 10">
+            <a:extLst>
+              <a:ext uri="{FF2B5EF4-FFF2-40B4-BE49-F238E27FC236}">
+                <a16:creationId xmlns:a16="http://schemas.microsoft.com/office/drawing/2014/main" id="{6AA61FD6-3582-4426-9F97-FB89EFED3255}"/>
+              </a:ext>
+            </a:extLst>
+          </p:cNvPr>
+          <p:cNvPicPr>
+            <a:picLocks noGrp="1" noChangeAspect="1"/>
+          </p:cNvPicPr>
+          <p:nvPr>
+            <p:ph idx="1"/>
+          </p:nvPr>
+        </p:nvPicPr>
+        <p:blipFill>
+          <a:blip r:embed="rId3"/>
+          <a:stretch>
+            <a:fillRect/>
+          </a:stretch>
+        </p:blipFill>
+        <p:spPr>
+          <a:xfrm>
+            <a:off x="1554956" y="1723486"/>
+            <a:ext cx="9234488" cy="1485900"/>
+          </a:xfrm>
+        </p:spPr>
+      </p:pic>
+    </p:spTree>
+    <p:extLst>
+      <p:ext uri="{BB962C8B-B14F-4D97-AF65-F5344CB8AC3E}">
+        <p14:creationId xmlns:p14="http://schemas.microsoft.com/office/powerpoint/2010/main" val="3373473633"/>
+      </p:ext>
+    </p:extLst>
+  </p:cSld>
+  <p:clrMapOvr>
+    <a:masterClrMapping/>
+  </p:clrMapOvr>
+</p:sld>
+</file>
+
+<file path=ppt/slides/slide13.xml><?xml version="1.0" encoding="utf-8"?>
+<p:sld xmlns:a="http://schemas.openxmlformats.org/drawingml/2006/main" xmlns:r="http://schemas.openxmlformats.org/officeDocument/2006/relationships" xmlns:p="http://schemas.openxmlformats.org/presentationml/2006/main">
+  <p:cSld>
+    <p:spTree>
+      <p:nvGrpSpPr>
+        <p:cNvPr id="1" name=""/>
+        <p:cNvGrpSpPr/>
+        <p:nvPr/>
+      </p:nvGrpSpPr>
+      <p:grpSpPr>
+        <a:xfrm>
+          <a:off x="0" y="0"/>
+          <a:ext cx="0" cy="0"/>
+          <a:chOff x="0" y="0"/>
+          <a:chExt cx="0" cy="0"/>
+        </a:xfrm>
+      </p:grpSpPr>
+      <p:sp>
+        <p:nvSpPr>
+          <p:cNvPr id="2" name="Titre 1">
+            <a:extLst>
+              <a:ext uri="{FF2B5EF4-FFF2-40B4-BE49-F238E27FC236}">
+                <a16:creationId xmlns:a16="http://schemas.microsoft.com/office/drawing/2014/main" id="{ADF48ED6-56A1-4FEA-821F-197656F082B3}"/>
+              </a:ext>
+            </a:extLst>
+          </p:cNvPr>
+          <p:cNvSpPr>
+            <a:spLocks noGrp="1"/>
+          </p:cNvSpPr>
+          <p:nvPr>
+            <p:ph type="title"/>
+          </p:nvPr>
+        </p:nvSpPr>
+        <p:spPr/>
+        <p:txBody>
+          <a:bodyPr/>
+          <a:lstStyle/>
+          <a:p>
+            <a:r>
+              <a:rPr lang="fr-FR" dirty="0"/>
+              <a:t>Analyse des données restants</a:t>
+            </a:r>
+          </a:p>
+        </p:txBody>
+      </p:sp>
+      <p:pic>
+        <p:nvPicPr>
+          <p:cNvPr id="5" name="Espace réservé du contenu 4">
+            <a:extLst>
+              <a:ext uri="{FF2B5EF4-FFF2-40B4-BE49-F238E27FC236}">
+                <a16:creationId xmlns:a16="http://schemas.microsoft.com/office/drawing/2014/main" id="{142C46F5-C8F9-4481-8538-DFEA2B2114A0}"/>
+              </a:ext>
+            </a:extLst>
+          </p:cNvPr>
+          <p:cNvPicPr>
+            <a:picLocks noGrp="1" noChangeAspect="1"/>
+          </p:cNvPicPr>
+          <p:nvPr>
+            <p:ph idx="1"/>
+          </p:nvPr>
+        </p:nvPicPr>
+        <p:blipFill>
+          <a:blip r:embed="rId2"/>
+          <a:stretch>
+            <a:fillRect/>
+          </a:stretch>
+        </p:blipFill>
+        <p:spPr>
+          <a:xfrm>
+            <a:off x="1971763" y="1699404"/>
+            <a:ext cx="8248473" cy="3581400"/>
+          </a:xfrm>
+        </p:spPr>
+      </p:pic>
+      <p:sp>
+        <p:nvSpPr>
+          <p:cNvPr id="6" name="ZoneTexte 5">
+            <a:extLst>
+              <a:ext uri="{FF2B5EF4-FFF2-40B4-BE49-F238E27FC236}">
+                <a16:creationId xmlns:a16="http://schemas.microsoft.com/office/drawing/2014/main" id="{89C8C163-92F0-41AE-B295-BED5D739B31B}"/>
+              </a:ext>
+            </a:extLst>
+          </p:cNvPr>
+          <p:cNvSpPr txBox="1"/>
+          <p:nvPr/>
+        </p:nvSpPr>
+        <p:spPr>
+          <a:xfrm>
+            <a:off x="2058838" y="5658928"/>
+            <a:ext cx="8730916" cy="923330"/>
+          </a:xfrm>
+          <a:prstGeom prst="rect">
+            <a:avLst/>
+          </a:prstGeom>
+          <a:noFill/>
+        </p:spPr>
+        <p:txBody>
+          <a:bodyPr wrap="none" rtlCol="0">
+            <a:spAutoFit/>
+          </a:bodyPr>
+          <a:lstStyle/>
+          <a:p>
+            <a:r>
+              <a:rPr lang="fr-FR" dirty="0"/>
+              <a:t>Ce graphique nous permet de comparer les 3 derniers joueurs du </a:t>
+            </a:r>
+            <a:r>
+              <a:rPr lang="fr-FR" dirty="0" err="1"/>
+              <a:t>dataset</a:t>
+            </a:r>
+            <a:r>
+              <a:rPr lang="fr-FR" dirty="0"/>
+              <a:t> après filtrage </a:t>
+            </a:r>
+          </a:p>
+          <a:p>
+            <a:r>
+              <a:rPr lang="fr-FR" dirty="0"/>
+              <a:t>par leur nombre de but des saisons 2016 à 2020</a:t>
+            </a:r>
+          </a:p>
+          <a:p>
+            <a:endParaRPr lang="fr-FR" dirty="0"/>
+          </a:p>
+        </p:txBody>
+      </p:sp>
+    </p:spTree>
+    <p:extLst>
+      <p:ext uri="{BB962C8B-B14F-4D97-AF65-F5344CB8AC3E}">
+        <p14:creationId xmlns:p14="http://schemas.microsoft.com/office/powerpoint/2010/main" val="2201170008"/>
+      </p:ext>
+    </p:extLst>
+  </p:cSld>
+  <p:clrMapOvr>
+    <a:masterClrMapping/>
+  </p:clrMapOvr>
+</p:sld>
+</file>
+
+<file path=ppt/slides/slide14.xml><?xml version="1.0" encoding="utf-8"?>
+<p:sld xmlns:a="http://schemas.openxmlformats.org/drawingml/2006/main" xmlns:r="http://schemas.openxmlformats.org/officeDocument/2006/relationships" xmlns:p="http://schemas.openxmlformats.org/presentationml/2006/main">
+  <p:cSld>
+    <p:spTree>
+      <p:nvGrpSpPr>
+        <p:cNvPr id="1" name=""/>
+        <p:cNvGrpSpPr/>
+        <p:nvPr/>
+      </p:nvGrpSpPr>
+      <p:grpSpPr>
+        <a:xfrm>
+          <a:off x="0" y="0"/>
+          <a:ext cx="0" cy="0"/>
+          <a:chOff x="0" y="0"/>
+          <a:chExt cx="0" cy="0"/>
+        </a:xfrm>
+      </p:grpSpPr>
+      <p:sp>
+        <p:nvSpPr>
+          <p:cNvPr id="2" name="Titre 1">
+            <a:extLst>
+              <a:ext uri="{FF2B5EF4-FFF2-40B4-BE49-F238E27FC236}">
+                <a16:creationId xmlns:a16="http://schemas.microsoft.com/office/drawing/2014/main" id="{4768A5A8-72F5-4EF1-8046-34AD2C935A8B}"/>
+              </a:ext>
+            </a:extLst>
+          </p:cNvPr>
+          <p:cNvSpPr>
+            <a:spLocks noGrp="1"/>
+          </p:cNvSpPr>
+          <p:nvPr>
+            <p:ph type="title"/>
+          </p:nvPr>
+        </p:nvSpPr>
+        <p:spPr/>
+        <p:txBody>
+          <a:bodyPr/>
+          <a:lstStyle/>
+          <a:p>
+            <a:r>
+              <a:rPr lang="fr-FR" dirty="0"/>
+              <a:t>Conclusion </a:t>
+            </a:r>
+          </a:p>
+        </p:txBody>
+      </p:sp>
+      <p:sp>
+        <p:nvSpPr>
+          <p:cNvPr id="3" name="Espace réservé du contenu 2">
+            <a:extLst>
+              <a:ext uri="{FF2B5EF4-FFF2-40B4-BE49-F238E27FC236}">
+                <a16:creationId xmlns:a16="http://schemas.microsoft.com/office/drawing/2014/main" id="{22E4E65D-E347-4995-905F-DEDDF9F3E88C}"/>
+              </a:ext>
+            </a:extLst>
+          </p:cNvPr>
+          <p:cNvSpPr>
+            <a:spLocks noGrp="1"/>
+          </p:cNvSpPr>
+          <p:nvPr>
+            <p:ph idx="1"/>
+          </p:nvPr>
+        </p:nvSpPr>
+        <p:spPr/>
+        <p:txBody>
+          <a:bodyPr/>
+          <a:lstStyle/>
+          <a:p>
+            <a:r>
+              <a:rPr lang="fr-FR" dirty="0"/>
+              <a:t>Après analyse on peut suggéré que Lionel Messi sera le meilleur buteur de la prochaine saison d’après nos critères de sélection</a:t>
+            </a:r>
+          </a:p>
+          <a:p>
+            <a:endParaRPr lang="fr-FR" dirty="0"/>
+          </a:p>
+          <a:p>
+            <a:r>
+              <a:rPr lang="fr-FR" dirty="0"/>
+              <a:t> </a:t>
+            </a:r>
+            <a:r>
+              <a:rPr lang="fr-FR" dirty="0" err="1"/>
+              <a:t>Dataset</a:t>
+            </a:r>
+            <a:r>
+              <a:rPr lang="fr-FR" dirty="0"/>
+              <a:t> pas assez complet</a:t>
+            </a:r>
+          </a:p>
+          <a:p>
+            <a:endParaRPr lang="fr-FR" dirty="0"/>
+          </a:p>
+          <a:p>
+            <a:r>
+              <a:rPr lang="fr-FR" dirty="0"/>
+              <a:t>Données manquantes</a:t>
+            </a:r>
+          </a:p>
+        </p:txBody>
+      </p:sp>
+    </p:spTree>
+    <p:extLst>
+      <p:ext uri="{BB962C8B-B14F-4D97-AF65-F5344CB8AC3E}">
+        <p14:creationId xmlns:p14="http://schemas.microsoft.com/office/powerpoint/2010/main" val="1675846437"/>
+      </p:ext>
+    </p:extLst>
+  </p:cSld>
+  <p:clrMapOvr>
+    <a:masterClrMapping/>
+  </p:clrMapOvr>
+</p:sld>
+</file>
+
+<file path=ppt/slides/slide15.xml><?xml version="1.0" encoding="utf-8"?>
+<p:sld xmlns:a="http://schemas.openxmlformats.org/drawingml/2006/main" xmlns:r="http://schemas.openxmlformats.org/officeDocument/2006/relationships" xmlns:p="http://schemas.openxmlformats.org/presentationml/2006/main">
+  <p:cSld>
+    <p:spTree>
+      <p:nvGrpSpPr>
+        <p:cNvPr id="1" name=""/>
+        <p:cNvGrpSpPr/>
+        <p:nvPr/>
+      </p:nvGrpSpPr>
+      <p:grpSpPr>
+        <a:xfrm>
+          <a:off x="0" y="0"/>
+          <a:ext cx="0" cy="0"/>
+          <a:chOff x="0" y="0"/>
+          <a:chExt cx="0" cy="0"/>
+        </a:xfrm>
+      </p:grpSpPr>
+      <p:sp>
+        <p:nvSpPr>
+          <p:cNvPr id="2" name="Titre 1">
+            <a:extLst>
+              <a:ext uri="{FF2B5EF4-FFF2-40B4-BE49-F238E27FC236}">
+                <a16:creationId xmlns:a16="http://schemas.microsoft.com/office/drawing/2014/main" id="{2FDCD256-18AC-4CC5-81A6-71FCDD3DF7CF}"/>
+              </a:ext>
+            </a:extLst>
+          </p:cNvPr>
+          <p:cNvSpPr>
+            <a:spLocks noGrp="1"/>
+          </p:cNvSpPr>
+          <p:nvPr>
+            <p:ph type="title"/>
+          </p:nvPr>
+        </p:nvSpPr>
+        <p:spPr/>
+        <p:txBody>
+          <a:bodyPr/>
+          <a:lstStyle/>
+          <a:p>
+            <a:r>
+              <a:rPr lang="fr-FR" dirty="0"/>
+              <a:t>Conclusion</a:t>
+            </a:r>
+          </a:p>
+        </p:txBody>
+      </p:sp>
+      <p:pic>
+        <p:nvPicPr>
+          <p:cNvPr id="5" name="Espace réservé du contenu 4">
+            <a:extLst>
+              <a:ext uri="{FF2B5EF4-FFF2-40B4-BE49-F238E27FC236}">
+                <a16:creationId xmlns:a16="http://schemas.microsoft.com/office/drawing/2014/main" id="{F1FF0678-9C29-41BE-95B1-6C87F429680B}"/>
+              </a:ext>
+            </a:extLst>
+          </p:cNvPr>
+          <p:cNvPicPr>
+            <a:picLocks noGrp="1" noChangeAspect="1"/>
+          </p:cNvPicPr>
+          <p:nvPr>
+            <p:ph idx="1"/>
+          </p:nvPr>
+        </p:nvPicPr>
+        <p:blipFill>
+          <a:blip r:embed="rId2"/>
+          <a:stretch>
+            <a:fillRect/>
+          </a:stretch>
+        </p:blipFill>
+        <p:spPr>
+          <a:xfrm>
+            <a:off x="1371600" y="1638300"/>
+            <a:ext cx="3472573" cy="3581400"/>
+          </a:xfrm>
+        </p:spPr>
+      </p:pic>
+      <p:pic>
+        <p:nvPicPr>
+          <p:cNvPr id="7" name="Image 6">
+            <a:extLst>
+              <a:ext uri="{FF2B5EF4-FFF2-40B4-BE49-F238E27FC236}">
+                <a16:creationId xmlns:a16="http://schemas.microsoft.com/office/drawing/2014/main" id="{DE949E11-34BA-41F9-B97C-A8DA642175AB}"/>
+              </a:ext>
+            </a:extLst>
+          </p:cNvPr>
+          <p:cNvPicPr>
+            <a:picLocks noChangeAspect="1"/>
+          </p:cNvPicPr>
+          <p:nvPr/>
+        </p:nvPicPr>
+        <p:blipFill>
+          <a:blip r:embed="rId3"/>
+          <a:stretch>
+            <a:fillRect/>
+          </a:stretch>
+        </p:blipFill>
+        <p:spPr>
+          <a:xfrm>
+            <a:off x="6500435" y="1638300"/>
+            <a:ext cx="4965079" cy="3542857"/>
+          </a:xfrm>
+          <a:prstGeom prst="rect">
+            <a:avLst/>
+          </a:prstGeom>
+        </p:spPr>
+      </p:pic>
+      <p:sp>
+        <p:nvSpPr>
+          <p:cNvPr id="9" name="ZoneTexte 8">
+            <a:extLst>
+              <a:ext uri="{FF2B5EF4-FFF2-40B4-BE49-F238E27FC236}">
+                <a16:creationId xmlns:a16="http://schemas.microsoft.com/office/drawing/2014/main" id="{03FE201D-DC7D-4562-859E-A01C38B53E03}"/>
+              </a:ext>
+            </a:extLst>
+          </p:cNvPr>
+          <p:cNvSpPr txBox="1"/>
+          <p:nvPr/>
+        </p:nvSpPr>
+        <p:spPr>
+          <a:xfrm>
+            <a:off x="2142449" y="5848709"/>
+            <a:ext cx="7907101" cy="369332"/>
+          </a:xfrm>
+          <a:prstGeom prst="rect">
+            <a:avLst/>
+          </a:prstGeom>
+          <a:noFill/>
+        </p:spPr>
+        <p:txBody>
+          <a:bodyPr wrap="none" rtlCol="0">
+            <a:spAutoFit/>
+          </a:bodyPr>
+          <a:lstStyle/>
+          <a:p>
+            <a:r>
+              <a:rPr lang="fr-FR" dirty="0"/>
+              <a:t>Le graphique et le nuage de point nous montre que le </a:t>
+            </a:r>
+            <a:r>
+              <a:rPr lang="fr-FR" dirty="0" err="1"/>
+              <a:t>dataset</a:t>
+            </a:r>
+            <a:r>
+              <a:rPr lang="fr-FR" dirty="0"/>
+              <a:t> n’est pas complet</a:t>
+            </a:r>
+          </a:p>
+        </p:txBody>
+      </p:sp>
+    </p:spTree>
+    <p:extLst>
+      <p:ext uri="{BB962C8B-B14F-4D97-AF65-F5344CB8AC3E}">
+        <p14:creationId xmlns:p14="http://schemas.microsoft.com/office/powerpoint/2010/main" val="3598956330"/>
+      </p:ext>
+    </p:extLst>
+  </p:cSld>
+  <p:clrMapOvr>
+    <a:masterClrMapping/>
+  </p:clrMapOvr>
+</p:sld>
+</file>
+
 <file path=ppt/slides/slide2.xml><?xml version="1.0" encoding="utf-8"?>
 <p:sld xmlns:a="http://schemas.openxmlformats.org/drawingml/2006/main" xmlns:r="http://schemas.openxmlformats.org/officeDocument/2006/relationships" xmlns:p="http://schemas.openxmlformats.org/presentationml/2006/main">
   <p:cSld>
@@ -3998,7 +4838,7 @@
             </a:pPr>
             <a:r>
               <a:rPr lang="fr-FR" dirty="0"/>
-              <a:t>Analyse après filtrage</a:t>
+              <a:t>Analyse des données restants</a:t>
             </a:r>
           </a:p>
           <a:p>
@@ -4113,12 +4953,6 @@
           <a:p>
             <a:endParaRPr lang="fr-FR" dirty="0"/>
           </a:p>
-          <a:p>
-            <a:r>
-              <a:rPr lang="fr-FR" dirty="0"/>
-              <a:t>Objectif : Prédire le meilleur buteur de la prochaine saison </a:t>
-            </a:r>
-          </a:p>
         </p:txBody>
       </p:sp>
     </p:spTree>
@@ -4218,6 +5052,35 @@
               </a:solidFill>
               <a:latin typeface="-apple-system"/>
             </a:endParaRPr>
+          </a:p>
+          <a:p>
+            <a:r>
+              <a:rPr lang="fr-FR" dirty="0">
+                <a:solidFill>
+                  <a:srgbClr val="24292F"/>
+                </a:solidFill>
+                <a:latin typeface="-apple-system"/>
+              </a:rPr>
+              <a:t>Objectif : Retrouver le joueur dans le </a:t>
+            </a:r>
+            <a:r>
+              <a:rPr lang="fr-FR" dirty="0" err="1">
+                <a:solidFill>
+                  <a:srgbClr val="24292F"/>
+                </a:solidFill>
+                <a:latin typeface="-apple-system"/>
+              </a:rPr>
+              <a:t>dataset</a:t>
+            </a:r>
+            <a:r>
+              <a:rPr lang="fr-FR" dirty="0">
+                <a:solidFill>
+                  <a:srgbClr val="24292F"/>
+                </a:solidFill>
+                <a:latin typeface="-apple-system"/>
+              </a:rPr>
+              <a:t> qui regroupe tout les critères d’un potentiel meilleur buteur pour la prochaine saison</a:t>
+            </a:r>
           </a:p>
           <a:p>
             <a:endParaRPr lang="fr-FR" dirty="0"/>
@@ -4603,7 +5466,7 @@
           <p:cNvPr id="2" name="Titre 1">
             <a:extLst>
               <a:ext uri="{FF2B5EF4-FFF2-40B4-BE49-F238E27FC236}">
-                <a16:creationId xmlns:a16="http://schemas.microsoft.com/office/drawing/2014/main" id="{AF3DA348-38D5-4F80-8FD3-2C065910C64F}"/>
+                <a16:creationId xmlns:a16="http://schemas.microsoft.com/office/drawing/2014/main" id="{FC0229C2-E4B5-4047-9575-D9DF5364D6C1}"/>
               </a:ext>
             </a:extLst>
           </p:cNvPr>
@@ -4621,17 +5484,17 @@
           <a:p>
             <a:r>
               <a:rPr lang="fr-FR" dirty="0"/>
-              <a:t>Filtrage des données après analyse</a:t>
+              <a:t>Présentation des données </a:t>
             </a:r>
           </a:p>
         </p:txBody>
       </p:sp>
       <p:pic>
         <p:nvPicPr>
-          <p:cNvPr id="9" name="Espace réservé du contenu 8">
+          <p:cNvPr id="5" name="Espace réservé du contenu 4">
             <a:extLst>
               <a:ext uri="{FF2B5EF4-FFF2-40B4-BE49-F238E27FC236}">
-                <a16:creationId xmlns:a16="http://schemas.microsoft.com/office/drawing/2014/main" id="{7F29BB10-FD32-41F4-AFB3-B160BAA15156}"/>
+                <a16:creationId xmlns:a16="http://schemas.microsoft.com/office/drawing/2014/main" id="{2B901D1A-4F39-49D6-A526-6AA9C12AF25D}"/>
               </a:ext>
             </a:extLst>
           </p:cNvPr>
@@ -4650,17 +5513,47 @@
         </p:blipFill>
         <p:spPr>
           <a:xfrm>
-            <a:off x="2909977" y="1662847"/>
-            <a:ext cx="6167882" cy="3793635"/>
+            <a:off x="1549017" y="1638300"/>
+            <a:ext cx="3897987" cy="3581400"/>
           </a:xfrm>
         </p:spPr>
       </p:pic>
-      <p:sp>
-        <p:nvSpPr>
-          <p:cNvPr id="10" name="ZoneTexte 9">
+      <p:pic>
+        <p:nvPicPr>
+          <p:cNvPr id="7" name="Image 6">
             <a:extLst>
               <a:ext uri="{FF2B5EF4-FFF2-40B4-BE49-F238E27FC236}">
-                <a16:creationId xmlns:a16="http://schemas.microsoft.com/office/drawing/2014/main" id="{C63B5E2A-93D1-45AC-88F7-B4170A2947C1}"/>
+                <a16:creationId xmlns:a16="http://schemas.microsoft.com/office/drawing/2014/main" id="{03C6EA01-3F2C-4A31-99AE-52969F2D2757}"/>
+              </a:ext>
+            </a:extLst>
+          </p:cNvPr>
+          <p:cNvPicPr>
+            <a:picLocks noChangeAspect="1"/>
+          </p:cNvPicPr>
+          <p:nvPr/>
+        </p:nvPicPr>
+        <p:blipFill>
+          <a:blip r:embed="rId3"/>
+          <a:stretch>
+            <a:fillRect/>
+          </a:stretch>
+        </p:blipFill>
+        <p:spPr>
+          <a:xfrm>
+            <a:off x="6744999" y="1638300"/>
+            <a:ext cx="3729800" cy="3581400"/>
+          </a:xfrm>
+          <a:prstGeom prst="rect">
+            <a:avLst/>
+          </a:prstGeom>
+        </p:spPr>
+      </p:pic>
+      <p:sp>
+        <p:nvSpPr>
+          <p:cNvPr id="8" name="ZoneTexte 7">
+            <a:extLst>
+              <a:ext uri="{FF2B5EF4-FFF2-40B4-BE49-F238E27FC236}">
+                <a16:creationId xmlns:a16="http://schemas.microsoft.com/office/drawing/2014/main" id="{D5AB35D7-ADCD-4293-BEDE-BAAE2B60565A}"/>
               </a:ext>
             </a:extLst>
           </p:cNvPr>
@@ -4669,8 +5562,8 @@
         </p:nvSpPr>
         <p:spPr>
           <a:xfrm>
-            <a:off x="1081177" y="5687849"/>
-            <a:ext cx="10426252" cy="646331"/>
+            <a:off x="1846052" y="5687682"/>
+            <a:ext cx="9576917" cy="646331"/>
           </a:xfrm>
           <a:prstGeom prst="rect">
             <a:avLst/>
@@ -4684,44 +5577,22 @@
           <a:lstStyle/>
           <a:p>
             <a:r>
-              <a:rPr lang="fr-FR" b="0" i="0" dirty="0">
-                <a:solidFill>
-                  <a:srgbClr val="444444"/>
-                </a:solidFill>
-                <a:effectLst/>
-                <a:latin typeface="Roboto" panose="020B0604020202020204" pitchFamily="2" charset="0"/>
-              </a:rPr>
-              <a:t>histogramme de comptage qui permet de savoir la moyenne du nombre de but pour tout les joueurs.</a:t>
-            </a:r>
-          </a:p>
-          <a:p>
-            <a:r>
-              <a:rPr lang="fr-FR" dirty="0">
-                <a:solidFill>
-                  <a:srgbClr val="444444"/>
-                </a:solidFill>
-                <a:latin typeface="Roboto" panose="020B0604020202020204" pitchFamily="2" charset="0"/>
-              </a:rPr>
-              <a:t>Comme on peut le voir sur le graphique la moyenne est de 11 buts pour les 660 joueurs </a:t>
-            </a:r>
-            <a:r>
-              <a:rPr lang="fr-FR" b="0" i="0" dirty="0">
-                <a:solidFill>
-                  <a:srgbClr val="444444"/>
-                </a:solidFill>
-                <a:effectLst/>
-                <a:latin typeface="Roboto" panose="020B0604020202020204" pitchFamily="2" charset="0"/>
-              </a:rPr>
-              <a:t> </a:t>
-            </a:r>
-            <a:endParaRPr lang="fr-FR" dirty="0"/>
+              <a:rPr lang="fr-FR" dirty="0"/>
+              <a:t>Ces 2 nuages de points permettent de faire une analyse entre 2 données pour avoir des critères </a:t>
+            </a:r>
+          </a:p>
+          <a:p>
+            <a:r>
+              <a:rPr lang="fr-FR" dirty="0"/>
+              <a:t>de sélection pour faire un comparatif des derniers joueurs restants </a:t>
+            </a:r>
           </a:p>
         </p:txBody>
       </p:sp>
     </p:spTree>
     <p:extLst>
       <p:ext uri="{BB962C8B-B14F-4D97-AF65-F5344CB8AC3E}">
-        <p14:creationId xmlns:p14="http://schemas.microsoft.com/office/powerpoint/2010/main" val="1272255025"/>
+        <p14:creationId xmlns:p14="http://schemas.microsoft.com/office/powerpoint/2010/main" val="4207960662"/>
       </p:ext>
     </p:extLst>
   </p:cSld>
@@ -4753,7 +5624,7 @@
           <p:cNvPr id="2" name="Titre 1">
             <a:extLst>
               <a:ext uri="{FF2B5EF4-FFF2-40B4-BE49-F238E27FC236}">
-                <a16:creationId xmlns:a16="http://schemas.microsoft.com/office/drawing/2014/main" id="{0EBAD006-2949-4554-9FD8-89C819A6560B}"/>
+                <a16:creationId xmlns:a16="http://schemas.microsoft.com/office/drawing/2014/main" id="{B31FC2A8-EF66-4DB8-B98A-17501946B7DD}"/>
               </a:ext>
             </a:extLst>
           </p:cNvPr>
@@ -4771,7 +5642,7 @@
           <a:p>
             <a:r>
               <a:rPr lang="fr-FR" dirty="0"/>
-              <a:t>Filtrage des données après analyse</a:t>
+              <a:t>Présentation des données</a:t>
             </a:r>
           </a:p>
         </p:txBody>
@@ -4781,7 +5652,7 @@
           <p:cNvPr id="5" name="Espace réservé du contenu 4">
             <a:extLst>
               <a:ext uri="{FF2B5EF4-FFF2-40B4-BE49-F238E27FC236}">
-                <a16:creationId xmlns:a16="http://schemas.microsoft.com/office/drawing/2014/main" id="{D7216D6B-770E-433D-971C-302BA8D5F476}"/>
+                <a16:creationId xmlns:a16="http://schemas.microsoft.com/office/drawing/2014/main" id="{702175A6-EE7E-4E8B-B875-41419051307D}"/>
               </a:ext>
             </a:extLst>
           </p:cNvPr>
@@ -4800,17 +5671,17 @@
         </p:blipFill>
         <p:spPr>
           <a:xfrm>
-            <a:off x="3318145" y="1845793"/>
-            <a:ext cx="5282539" cy="3530159"/>
+            <a:off x="1968450" y="1739661"/>
+            <a:ext cx="8695048" cy="3581400"/>
           </a:xfrm>
         </p:spPr>
       </p:pic>
       <p:sp>
         <p:nvSpPr>
-          <p:cNvPr id="7" name="ZoneTexte 6">
+          <p:cNvPr id="6" name="ZoneTexte 5">
             <a:extLst>
               <a:ext uri="{FF2B5EF4-FFF2-40B4-BE49-F238E27FC236}">
-                <a16:creationId xmlns:a16="http://schemas.microsoft.com/office/drawing/2014/main" id="{A8F59E4A-88CA-4643-9852-E8E3A88A5D91}"/>
+                <a16:creationId xmlns:a16="http://schemas.microsoft.com/office/drawing/2014/main" id="{05AB4C7A-35AC-47EC-878F-5F4B331B991A}"/>
               </a:ext>
             </a:extLst>
           </p:cNvPr>
@@ -4819,8 +5690,8 @@
         </p:nvSpPr>
         <p:spPr>
           <a:xfrm>
-            <a:off x="1598762" y="5601419"/>
-            <a:ext cx="9389430" cy="923330"/>
+            <a:off x="1968450" y="5802868"/>
+            <a:ext cx="9501640" cy="646331"/>
           </a:xfrm>
           <a:prstGeom prst="rect">
             <a:avLst/>
@@ -4834,28 +5705,18 @@
           <a:lstStyle/>
           <a:p>
             <a:r>
+              <a:rPr lang="fr-FR" dirty="0" err="1"/>
+              <a:t>Boxplot</a:t>
+            </a:r>
+            <a:r>
               <a:rPr lang="fr-FR" dirty="0"/>
-              <a:t>Histogramme représentant le nombre total de minute jouées par les joueurs. Ca va permettre </a:t>
+              <a:t> représentant une moyenne de but par rapport au match joué elle nous permet de savoir</a:t>
             </a:r>
           </a:p>
           <a:p>
             <a:r>
               <a:rPr lang="fr-FR" dirty="0"/>
-              <a:t>sur tout les joueurs restant du </a:t>
-            </a:r>
-            <a:r>
-              <a:rPr lang="fr-FR" dirty="0" err="1"/>
-              <a:t>dataset</a:t>
-            </a:r>
-            <a:r>
-              <a:rPr lang="fr-FR" dirty="0"/>
-              <a:t> de faire une moyenne du temps joué. Ici la moyenne est</a:t>
-            </a:r>
-          </a:p>
-          <a:p>
-            <a:r>
-              <a:rPr lang="fr-FR" dirty="0"/>
-              <a:t>De 3000 minutes</a:t>
+              <a:t>que plus un joueur joue de match plus il marque </a:t>
             </a:r>
           </a:p>
         </p:txBody>
@@ -4863,7 +5724,157 @@
     </p:spTree>
     <p:extLst>
       <p:ext uri="{BB962C8B-B14F-4D97-AF65-F5344CB8AC3E}">
-        <p14:creationId xmlns:p14="http://schemas.microsoft.com/office/powerpoint/2010/main" val="4120447997"/>
+        <p14:creationId xmlns:p14="http://schemas.microsoft.com/office/powerpoint/2010/main" val="2340456165"/>
+      </p:ext>
+    </p:extLst>
+  </p:cSld>
+  <p:clrMapOvr>
+    <a:masterClrMapping/>
+  </p:clrMapOvr>
+</p:sld>
+</file>
+
+<file path=ppt/slides/slide9.xml><?xml version="1.0" encoding="utf-8"?>
+<p:sld xmlns:a="http://schemas.openxmlformats.org/drawingml/2006/main" xmlns:r="http://schemas.openxmlformats.org/officeDocument/2006/relationships" xmlns:p="http://schemas.openxmlformats.org/presentationml/2006/main">
+  <p:cSld>
+    <p:spTree>
+      <p:nvGrpSpPr>
+        <p:cNvPr id="1" name=""/>
+        <p:cNvGrpSpPr/>
+        <p:nvPr/>
+      </p:nvGrpSpPr>
+      <p:grpSpPr>
+        <a:xfrm>
+          <a:off x="0" y="0"/>
+          <a:ext cx="0" cy="0"/>
+          <a:chOff x="0" y="0"/>
+          <a:chExt cx="0" cy="0"/>
+        </a:xfrm>
+      </p:grpSpPr>
+      <p:sp>
+        <p:nvSpPr>
+          <p:cNvPr id="2" name="Titre 1">
+            <a:extLst>
+              <a:ext uri="{FF2B5EF4-FFF2-40B4-BE49-F238E27FC236}">
+                <a16:creationId xmlns:a16="http://schemas.microsoft.com/office/drawing/2014/main" id="{AF3DA348-38D5-4F80-8FD3-2C065910C64F}"/>
+              </a:ext>
+            </a:extLst>
+          </p:cNvPr>
+          <p:cNvSpPr>
+            <a:spLocks noGrp="1"/>
+          </p:cNvSpPr>
+          <p:nvPr>
+            <p:ph type="title"/>
+          </p:nvPr>
+        </p:nvSpPr>
+        <p:spPr/>
+        <p:txBody>
+          <a:bodyPr/>
+          <a:lstStyle/>
+          <a:p>
+            <a:r>
+              <a:rPr lang="fr-FR" dirty="0"/>
+              <a:t>Filtrage des données après analyse</a:t>
+            </a:r>
+          </a:p>
+        </p:txBody>
+      </p:sp>
+      <p:pic>
+        <p:nvPicPr>
+          <p:cNvPr id="9" name="Espace réservé du contenu 8">
+            <a:extLst>
+              <a:ext uri="{FF2B5EF4-FFF2-40B4-BE49-F238E27FC236}">
+                <a16:creationId xmlns:a16="http://schemas.microsoft.com/office/drawing/2014/main" id="{7F29BB10-FD32-41F4-AFB3-B160BAA15156}"/>
+              </a:ext>
+            </a:extLst>
+          </p:cNvPr>
+          <p:cNvPicPr>
+            <a:picLocks noGrp="1" noChangeAspect="1"/>
+          </p:cNvPicPr>
+          <p:nvPr>
+            <p:ph idx="1"/>
+          </p:nvPr>
+        </p:nvPicPr>
+        <p:blipFill>
+          <a:blip r:embed="rId2"/>
+          <a:stretch>
+            <a:fillRect/>
+          </a:stretch>
+        </p:blipFill>
+        <p:spPr>
+          <a:xfrm>
+            <a:off x="2909977" y="1662847"/>
+            <a:ext cx="6167882" cy="3793635"/>
+          </a:xfrm>
+        </p:spPr>
+      </p:pic>
+      <p:sp>
+        <p:nvSpPr>
+          <p:cNvPr id="10" name="ZoneTexte 9">
+            <a:extLst>
+              <a:ext uri="{FF2B5EF4-FFF2-40B4-BE49-F238E27FC236}">
+                <a16:creationId xmlns:a16="http://schemas.microsoft.com/office/drawing/2014/main" id="{C63B5E2A-93D1-45AC-88F7-B4170A2947C1}"/>
+              </a:ext>
+            </a:extLst>
+          </p:cNvPr>
+          <p:cNvSpPr txBox="1"/>
+          <p:nvPr/>
+        </p:nvSpPr>
+        <p:spPr>
+          <a:xfrm>
+            <a:off x="1081177" y="5687849"/>
+            <a:ext cx="10426252" cy="646331"/>
+          </a:xfrm>
+          <a:prstGeom prst="rect">
+            <a:avLst/>
+          </a:prstGeom>
+          <a:noFill/>
+        </p:spPr>
+        <p:txBody>
+          <a:bodyPr wrap="none" rtlCol="0">
+            <a:spAutoFit/>
+          </a:bodyPr>
+          <a:lstStyle/>
+          <a:p>
+            <a:r>
+              <a:rPr lang="fr-FR" b="0" i="0" dirty="0">
+                <a:solidFill>
+                  <a:srgbClr val="444444"/>
+                </a:solidFill>
+                <a:effectLst/>
+                <a:latin typeface="Roboto" panose="020B0604020202020204" pitchFamily="2" charset="0"/>
+              </a:rPr>
+              <a:t>histogramme de comptage qui permet de savoir la moyenne du nombre de but pour tout les joueurs.</a:t>
+            </a:r>
+          </a:p>
+          <a:p>
+            <a:r>
+              <a:rPr lang="fr-FR" dirty="0">
+                <a:solidFill>
+                  <a:srgbClr val="444444"/>
+                </a:solidFill>
+                <a:latin typeface="Roboto" panose="020B0604020202020204" pitchFamily="2" charset="0"/>
+              </a:rPr>
+              <a:t>Comme on peut le voir sur le graphique la moyenne est de 11 buts pour les 660 joueurs </a:t>
+            </a:r>
+            <a:r>
+              <a:rPr lang="fr-FR" b="0" i="0" dirty="0">
+                <a:solidFill>
+                  <a:srgbClr val="444444"/>
+                </a:solidFill>
+                <a:effectLst/>
+                <a:latin typeface="Roboto" panose="020B0604020202020204" pitchFamily="2" charset="0"/>
+              </a:rPr>
+              <a:t> </a:t>
+            </a:r>
+            <a:endParaRPr lang="fr-FR" dirty="0"/>
+          </a:p>
+        </p:txBody>
+      </p:sp>
+    </p:spTree>
+    <p:extLst>
+      <p:ext uri="{BB962C8B-B14F-4D97-AF65-F5344CB8AC3E}">
+        <p14:creationId xmlns:p14="http://schemas.microsoft.com/office/powerpoint/2010/main" val="1272255025"/>
       </p:ext>
     </p:extLst>
   </p:cSld>

</xml_diff>